<commit_message>
made a couple of changes
Made a couple of changes to the technical report
</commit_message>
<xml_diff>
--- a/VRInGame_FinalPresentation.pptx
+++ b/VRInGame_FinalPresentation.pptx
@@ -29,16 +29,17 @@
     <p:sldId id="274" r:id="rId24"/>
     <p:sldId id="275" r:id="rId25"/>
     <p:sldId id="276" r:id="rId26"/>
+    <p:sldId id="277" r:id="rId27"/>
   </p:sldIdLst>
   <p:sldSz cy="5143500" cx="9144000"/>
   <p:notesSz cx="6858000" cy="9144000"/>
   <p:embeddedFontLst>
     <p:embeddedFont>
       <p:font typeface="Roboto"/>
-      <p:regular r:id="rId27"/>
-      <p:bold r:id="rId28"/>
-      <p:italic r:id="rId29"/>
-      <p:boldItalic r:id="rId30"/>
+      <p:regular r:id="rId28"/>
+      <p:bold r:id="rId29"/>
+      <p:italic r:id="rId30"/>
+      <p:boldItalic r:id="rId31"/>
     </p:embeddedFont>
   </p:embeddedFontLst>
   <p:defaultTextStyle>
@@ -2040,6 +2041,104 @@
       <p:sp>
         <p:nvSpPr>
           <p:cNvPr id="205" name="Shape 205"/>
+          <p:cNvSpPr txBox="1"/>
+          <p:nvPr>
+            <p:ph idx="1" type="body"/>
+          </p:nvPr>
+        </p:nvSpPr>
+        <p:spPr>
+          <a:xfrm>
+            <a:off x="685800" y="4343400"/>
+            <a:ext cx="5486400" cy="4114800"/>
+          </a:xfrm>
+          <a:prstGeom prst="rect">
+            <a:avLst/>
+          </a:prstGeom>
+        </p:spPr>
+        <p:txBody>
+          <a:bodyPr anchorCtr="0" anchor="t" bIns="91425" lIns="91425" spcFirstLastPara="1" rIns="91425" wrap="square" tIns="91425">
+            <a:noAutofit/>
+          </a:bodyPr>
+          <a:lstStyle/>
+          <a:p>
+            <a:pPr indent="0" lvl="0" marL="0">
+              <a:spcBef>
+                <a:spcPts val="0"/>
+              </a:spcBef>
+              <a:spcAft>
+                <a:spcPts val="0"/>
+              </a:spcAft>
+              <a:buNone/>
+            </a:pPr>
+            <a:r>
+              <a:t/>
+            </a:r>
+            <a:endParaRPr/>
+          </a:p>
+        </p:txBody>
+      </p:sp>
+    </p:spTree>
+  </p:cSld>
+  <p:clrMapOvr>
+    <a:masterClrMapping/>
+  </p:clrMapOvr>
+</p:notes>
+</file>
+
+<file path=ppt/notesSlides/notesSlide22.xml><?xml version="1.0" encoding="utf-8"?>
+<p:notes xmlns:a="http://schemas.openxmlformats.org/drawingml/2006/main" xmlns:r="http://schemas.openxmlformats.org/officeDocument/2006/relationships" xmlns:mc="http://schemas.openxmlformats.org/markup-compatibility/2006" xmlns:mv="urn:schemas-microsoft-com:mac:vml" xmlns:p="http://schemas.openxmlformats.org/presentationml/2006/main" xmlns:c="http://schemas.openxmlformats.org/drawingml/2006/chart" xmlns:dgm="http://schemas.openxmlformats.org/drawingml/2006/diagram" xmlns:o="urn:schemas-microsoft-com:office:office" xmlns:v="urn:schemas-microsoft-com:vml" xmlns:pvml="urn:schemas-microsoft-com:office:powerpoint" xmlns:com="http://schemas.openxmlformats.org/drawingml/2006/compatibility" xmlns:p14="http://schemas.microsoft.com/office/powerpoint/2010/main" xmlns:p15="http://schemas.microsoft.com/office/powerpoint/2012/main" showMasterPhAnim="0" showMasterSp="0">
+  <p:cSld>
+    <p:spTree>
+      <p:nvGrpSpPr>
+        <p:cNvPr id="209" name="Shape 209"/>
+        <p:cNvGrpSpPr/>
+        <p:nvPr/>
+      </p:nvGrpSpPr>
+      <p:grpSpPr>
+        <a:xfrm>
+          <a:off x="0" y="0"/>
+          <a:ext cx="0" cy="0"/>
+          <a:chOff x="0" y="0"/>
+          <a:chExt cx="0" cy="0"/>
+        </a:xfrm>
+      </p:grpSpPr>
+      <p:sp>
+        <p:nvSpPr>
+          <p:cNvPr id="210" name="Shape 210"/>
+          <p:cNvSpPr/>
+          <p:nvPr>
+            <p:ph idx="2" type="sldImg"/>
+          </p:nvPr>
+        </p:nvSpPr>
+        <p:spPr>
+          <a:xfrm>
+            <a:off x="381300" y="685800"/>
+            <a:ext cx="6096000" cy="3429000"/>
+          </a:xfrm>
+          <a:custGeom>
+            <a:pathLst>
+              <a:path extrusionOk="0" h="120000" w="120000">
+                <a:moveTo>
+                  <a:pt x="0" y="0"/>
+                </a:moveTo>
+                <a:lnTo>
+                  <a:pt x="120000" y="0"/>
+                </a:lnTo>
+                <a:lnTo>
+                  <a:pt x="120000" y="120000"/>
+                </a:lnTo>
+                <a:lnTo>
+                  <a:pt x="0" y="120000"/>
+                </a:lnTo>
+                <a:close/>
+              </a:path>
+            </a:pathLst>
+          </a:custGeom>
+        </p:spPr>
+      </p:sp>
+      <p:sp>
+        <p:nvSpPr>
+          <p:cNvPr id="211" name="Shape 211"/>
           <p:cNvSpPr txBox="1"/>
           <p:nvPr>
             <p:ph idx="1" type="body"/>
@@ -11820,6 +11919,149 @@
         </p:nvSpPr>
         <p:spPr>
           <a:xfrm>
+            <a:off x="267200" y="111147"/>
+            <a:ext cx="8222100" cy="838800"/>
+          </a:xfrm>
+          <a:prstGeom prst="rect">
+            <a:avLst/>
+          </a:prstGeom>
+        </p:spPr>
+        <p:txBody>
+          <a:bodyPr anchorCtr="0" anchor="b" bIns="91425" lIns="91425" spcFirstLastPara="1" rIns="91425" wrap="square" tIns="91425">
+            <a:noAutofit/>
+          </a:bodyPr>
+          <a:lstStyle/>
+          <a:p>
+            <a:pPr indent="0" lvl="0" marL="0">
+              <a:spcBef>
+                <a:spcPts val="0"/>
+              </a:spcBef>
+              <a:spcAft>
+                <a:spcPts val="0"/>
+              </a:spcAft>
+              <a:buNone/>
+            </a:pPr>
+            <a:r>
+              <a:rPr lang="en"/>
+              <a:t>References</a:t>
+            </a:r>
+            <a:endParaRPr/>
+          </a:p>
+        </p:txBody>
+      </p:sp>
+      <p:sp>
+        <p:nvSpPr>
+          <p:cNvPr id="208" name="Shape 208"/>
+          <p:cNvSpPr txBox="1"/>
+          <p:nvPr>
+            <p:ph idx="1" type="subTitle"/>
+          </p:nvPr>
+        </p:nvSpPr>
+        <p:spPr>
+          <a:xfrm>
+            <a:off x="371200" y="950004"/>
+            <a:ext cx="8222100" cy="3097200"/>
+          </a:xfrm>
+          <a:prstGeom prst="rect">
+            <a:avLst/>
+          </a:prstGeom>
+        </p:spPr>
+        <p:txBody>
+          <a:bodyPr anchorCtr="0" anchor="t" bIns="91425" lIns="91425" spcFirstLastPara="1" rIns="91425" wrap="square" tIns="91425">
+            <a:noAutofit/>
+          </a:bodyPr>
+          <a:lstStyle/>
+          <a:p>
+            <a:pPr indent="0" lvl="0" marL="0">
+              <a:spcBef>
+                <a:spcPts val="0"/>
+              </a:spcBef>
+              <a:spcAft>
+                <a:spcPts val="0"/>
+              </a:spcAft>
+              <a:buNone/>
+            </a:pPr>
+            <a:r>
+              <a:rPr lang="en" sz="1800"/>
+              <a:t>[1] Unity3d.com, 'Unity Manual: for water, Transform, Rigidbody movement', 2018. [Online]. Available: https://unity3d.com/learn/tutorials. [Accessed: 03-Feb-2018].</a:t>
+            </a:r>
+            <a:br>
+              <a:rPr lang="en" sz="1800"/>
+            </a:br>
+            <a:r>
+              <a:rPr lang="en" sz="1800"/>
+              <a:t>[2] Rudolphkc.com, 'To know about breath sensor and DAC', 2018. [Online]. Available: http://www.rudolphkc.com/. [Accessed: 20-Mar-2018].</a:t>
+            </a:r>
+            <a:br>
+              <a:rPr lang="en" sz="1800"/>
+            </a:br>
+            <a:r>
+              <a:rPr lang="en" sz="1800"/>
+              <a:t>[3] Oculusstudios.com, 'To use oculus utilities with Unity', 2018. [Online]. Available: http://oculusstudios.com/work/. [Accessed: 25-Mar-2018].</a:t>
+            </a:r>
+            <a:br>
+              <a:rPr lang="en" sz="1800"/>
+            </a:br>
+            <a:r>
+              <a:rPr lang="en" sz="1800"/>
+              <a:t>[4] S. Attaway, Matlab: A Practical Introduction to Programming and Problem Solving. (2nd;2; ed.) 2012;2014;.</a:t>
+            </a:r>
+            <a:br>
+              <a:rPr lang="en" sz="1800"/>
+            </a:br>
+            <a:r>
+              <a:rPr lang="en" sz="1800"/>
+              <a:t>[5] W. Goldstone, Unity Game Development Essentials. 2009.</a:t>
+            </a:r>
+            <a:br>
+              <a:rPr lang="en" sz="1800"/>
+            </a:br>
+            <a:r>
+              <a:rPr lang="en" sz="1800"/>
+              <a:t>[6] Mathworks.com, 'To learn about Matlab', 2018. [Online]. Available: https://www.mathworks.com/academia.html?s_tid=gn_acad#learn-basics. [Accessed: 25-Feb-2018].</a:t>
+            </a:r>
+            <a:br>
+              <a:rPr lang="en" sz="1400"/>
+            </a:br>
+            <a:endParaRPr sz="1400"/>
+          </a:p>
+        </p:txBody>
+      </p:sp>
+    </p:spTree>
+  </p:cSld>
+  <p:clrMapOvr>
+    <a:masterClrMapping/>
+  </p:clrMapOvr>
+</p:sld>
+</file>
+
+<file path=ppt/slides/slide22.xml><?xml version="1.0" encoding="utf-8"?>
+<p:sld xmlns:a="http://schemas.openxmlformats.org/drawingml/2006/main" xmlns:r="http://schemas.openxmlformats.org/officeDocument/2006/relationships" xmlns:mc="http://schemas.openxmlformats.org/markup-compatibility/2006" xmlns:mv="urn:schemas-microsoft-com:mac:vml" xmlns:p="http://schemas.openxmlformats.org/presentationml/2006/main" xmlns:c="http://schemas.openxmlformats.org/drawingml/2006/chart" xmlns:dgm="http://schemas.openxmlformats.org/drawingml/2006/diagram" xmlns:o="urn:schemas-microsoft-com:office:office" xmlns:v="urn:schemas-microsoft-com:vml" xmlns:pvml="urn:schemas-microsoft-com:office:powerpoint" xmlns:com="http://schemas.openxmlformats.org/drawingml/2006/compatibility" xmlns:p14="http://schemas.microsoft.com/office/powerpoint/2010/main" xmlns:p15="http://schemas.microsoft.com/office/powerpoint/2012/main">
+  <p:cSld>
+    <p:spTree>
+      <p:nvGrpSpPr>
+        <p:cNvPr id="212" name="Shape 212"/>
+        <p:cNvGrpSpPr/>
+        <p:nvPr/>
+      </p:nvGrpSpPr>
+      <p:grpSpPr>
+        <a:xfrm>
+          <a:off x="0" y="0"/>
+          <a:ext cx="0" cy="0"/>
+          <a:chOff x="0" y="0"/>
+          <a:chExt cx="0" cy="0"/>
+        </a:xfrm>
+      </p:grpSpPr>
+      <p:sp>
+        <p:nvSpPr>
+          <p:cNvPr id="213" name="Shape 213"/>
+          <p:cNvSpPr txBox="1"/>
+          <p:nvPr>
+            <p:ph type="ctrTitle"/>
+          </p:nvPr>
+        </p:nvSpPr>
+        <p:spPr>
+          <a:xfrm>
             <a:off x="598100" y="1732947"/>
             <a:ext cx="8222100" cy="838800"/>
           </a:xfrm>

</xml_diff>